<commit_message>
2010.04.01 14:30 - First draft version of the presentation.
</commit_message>
<xml_diff>
--- a/lectures/8. ASP.NET – Part I.pptx
+++ b/lectures/8. ASP.NET – Part I.pptx
@@ -289,7 +289,7 @@
             <a:fld id="{3BF7C7B5-275F-4D1F-9AB4-9255447DBC73}" type="datetimeFigureOut">
               <a:rPr lang="en-US"/>
               <a:pPr/>
-              <a:t>3/31/2010</a:t>
+              <a:t>4/1/2010</a:t>
             </a:fld>
             <a:endParaRPr lang="en-US" dirty="0"/>
           </a:p>
@@ -520,7 +520,7 @@
             <a:fld id="{9B46F231-FB2B-4655-A644-E2477325E686}" type="datetimeFigureOut">
               <a:rPr lang="en-US"/>
               <a:pPr/>
-              <a:t>3/31/2010</a:t>
+              <a:t>4/1/2010</a:t>
             </a:fld>
             <a:endParaRPr lang="en-US" dirty="0"/>
           </a:p>
@@ -8034,7 +8034,6 @@
               <a:rPr lang="en-US" dirty="0" smtClean="0"/>
               <a:t>When a page runs it goes through series of processing steps</a:t>
             </a:r>
-            <a:endParaRPr lang="en-US" dirty="0" smtClean="0"/>
           </a:p>
           <a:p>
             <a:r>
@@ -8059,7 +8058,6 @@
               <a:rPr lang="en-US" dirty="0" smtClean="0"/>
               <a:t>Lifecycle events</a:t>
             </a:r>
-            <a:endParaRPr lang="en-US" dirty="0" smtClean="0"/>
           </a:p>
         </p:txBody>
       </p:sp>
@@ -8484,11 +8482,7 @@
             <a:pPr lvl="1"/>
             <a:r>
               <a:rPr lang="en-US" dirty="0" smtClean="0"/>
-              <a:t>Coding </a:t>
-            </a:r>
-            <a:r>
-              <a:rPr lang="en-US" dirty="0" smtClean="0"/>
-              <a:t>Methods</a:t>
+              <a:t>Coding Methods</a:t>
             </a:r>
           </a:p>
           <a:p>
@@ -8501,11 +8495,7 @@
             <a:pPr lvl="1"/>
             <a:r>
               <a:rPr lang="en-US" dirty="0" smtClean="0"/>
-              <a:t>HTML </a:t>
-            </a:r>
-            <a:r>
-              <a:rPr lang="en-US" dirty="0" smtClean="0"/>
-              <a:t>Controls</a:t>
+              <a:t>HTML Controls</a:t>
             </a:r>
           </a:p>
           <a:p>

</xml_diff>